<commit_message>
Updated with constrast color
</commit_message>
<xml_diff>
--- a/src/Assets/GAB2016 - Diagrams.pptx
+++ b/src/Assets/GAB2016 - Diagrams.pptx
@@ -3016,6 +3016,11 @@
           <a:prstGeom prst="roundRect">
             <a:avLst/>
           </a:prstGeom>
+          <a:solidFill>
+            <a:schemeClr val="bg1">
+              <a:lumMod val="50000"/>
+            </a:schemeClr>
+          </a:solidFill>
         </p:spPr>
         <p:style>
           <a:lnRef idx="2">
@@ -3222,6 +3227,11 @@
           <a:prstGeom prst="roundRect">
             <a:avLst/>
           </a:prstGeom>
+          <a:solidFill>
+            <a:schemeClr val="bg1">
+              <a:lumMod val="50000"/>
+            </a:schemeClr>
+          </a:solidFill>
         </p:spPr>
         <p:style>
           <a:lnRef idx="2">
@@ -3438,6 +3448,11 @@
           <a:prstGeom prst="roundRect">
             <a:avLst/>
           </a:prstGeom>
+          <a:solidFill>
+            <a:schemeClr val="bg1">
+              <a:lumMod val="50000"/>
+            </a:schemeClr>
+          </a:solidFill>
         </p:spPr>
         <p:style>
           <a:lnRef idx="2">
@@ -4210,6 +4225,11 @@
           <a:prstGeom prst="roundRect">
             <a:avLst/>
           </a:prstGeom>
+          <a:solidFill>
+            <a:schemeClr val="bg1">
+              <a:lumMod val="50000"/>
+            </a:schemeClr>
+          </a:solidFill>
         </p:spPr>
         <p:style>
           <a:lnRef idx="2">
@@ -4394,6 +4414,13 @@
   <p:clrMapOvr>
     <a:masterClrMapping/>
   </p:clrMapOvr>
+  <p:timing>
+    <p:tnLst>
+      <p:par>
+        <p:cTn id="1" dur="indefinite" restart="never" nodeType="tmRoot"/>
+      </p:par>
+    </p:tnLst>
+  </p:timing>
 </p:sld>
 </file>
 

</xml_diff>

<commit_message>
Added diagram with actual API-calls for main data flow
</commit_message>
<xml_diff>
--- a/src/Assets/GAB2016 - Diagrams.pptx
+++ b/src/Assets/GAB2016 - Diagrams.pptx
@@ -6,6 +6,7 @@
   </p:sldMasterIdLst>
   <p:sldIdLst>
     <p:sldId id="256" r:id="rId2"/>
+    <p:sldId id="257" r:id="rId3"/>
   </p:sldIdLst>
   <p:sldSz cx="12192000" cy="6858000"/>
   <p:notesSz cx="6858000" cy="9144000"/>
@@ -4424,6 +4425,1730 @@
 </p:sld>
 </file>
 
+<file path=ppt/slides/slide2.xml><?xml version="1.0" encoding="utf-8"?>
+<p:sld xmlns:a="http://schemas.openxmlformats.org/drawingml/2006/main" xmlns:r="http://schemas.openxmlformats.org/officeDocument/2006/relationships" xmlns:p="http://schemas.openxmlformats.org/presentationml/2006/main">
+  <p:cSld>
+    <p:spTree>
+      <p:nvGrpSpPr>
+        <p:cNvPr id="1" name=""/>
+        <p:cNvGrpSpPr/>
+        <p:nvPr/>
+      </p:nvGrpSpPr>
+      <p:grpSpPr>
+        <a:xfrm>
+          <a:off x="0" y="0"/>
+          <a:ext cx="0" cy="0"/>
+          <a:chOff x="0" y="0"/>
+          <a:chExt cx="0" cy="0"/>
+        </a:xfrm>
+      </p:grpSpPr>
+      <p:sp>
+        <p:nvSpPr>
+          <p:cNvPr id="4" name="Rectangle 3"/>
+          <p:cNvSpPr/>
+          <p:nvPr/>
+        </p:nvSpPr>
+        <p:spPr>
+          <a:xfrm>
+            <a:off x="146649" y="4123428"/>
+            <a:ext cx="1940943" cy="2605177"/>
+          </a:xfrm>
+          <a:prstGeom prst="rect">
+            <a:avLst/>
+          </a:prstGeom>
+        </p:spPr>
+        <p:style>
+          <a:lnRef idx="2">
+            <a:schemeClr val="dk1"/>
+          </a:lnRef>
+          <a:fillRef idx="1">
+            <a:schemeClr val="lt1"/>
+          </a:fillRef>
+          <a:effectRef idx="0">
+            <a:schemeClr val="dk1"/>
+          </a:effectRef>
+          <a:fontRef idx="minor">
+            <a:schemeClr val="dk1"/>
+          </a:fontRef>
+        </p:style>
+        <p:txBody>
+          <a:bodyPr rtlCol="0" anchor="ctr"/>
+          <a:lstStyle/>
+          <a:p>
+            <a:pPr algn="ctr"/>
+            <a:endParaRPr lang="en-US"/>
+          </a:p>
+        </p:txBody>
+      </p:sp>
+      <p:sp>
+        <p:nvSpPr>
+          <p:cNvPr id="5" name="Rounded Rectangle 4"/>
+          <p:cNvSpPr/>
+          <p:nvPr/>
+        </p:nvSpPr>
+        <p:spPr>
+          <a:xfrm>
+            <a:off x="1104181" y="600421"/>
+            <a:ext cx="1457865" cy="543464"/>
+          </a:xfrm>
+          <a:prstGeom prst="roundRect">
+            <a:avLst/>
+          </a:prstGeom>
+          <a:solidFill>
+            <a:schemeClr val="bg1">
+              <a:lumMod val="50000"/>
+            </a:schemeClr>
+          </a:solidFill>
+        </p:spPr>
+        <p:style>
+          <a:lnRef idx="2">
+            <a:schemeClr val="accent3">
+              <a:shade val="50000"/>
+            </a:schemeClr>
+          </a:lnRef>
+          <a:fillRef idx="1">
+            <a:schemeClr val="accent3"/>
+          </a:fillRef>
+          <a:effectRef idx="0">
+            <a:schemeClr val="accent3"/>
+          </a:effectRef>
+          <a:fontRef idx="minor">
+            <a:schemeClr val="lt1"/>
+          </a:fontRef>
+        </p:style>
+        <p:txBody>
+          <a:bodyPr rtlCol="0" anchor="ctr"/>
+          <a:lstStyle/>
+          <a:p>
+            <a:pPr algn="ctr"/>
+            <a:r>
+              <a:rPr lang="nb-NO" sz="1200" dirty="0" err="1" smtClean="0"/>
+              <a:t>EmployeeRecords</a:t>
+            </a:r>
+            <a:endParaRPr lang="en-US" sz="1200" dirty="0"/>
+          </a:p>
+        </p:txBody>
+      </p:sp>
+      <p:sp>
+        <p:nvSpPr>
+          <p:cNvPr id="6" name="Rounded Rectangle 5"/>
+          <p:cNvSpPr/>
+          <p:nvPr/>
+        </p:nvSpPr>
+        <p:spPr>
+          <a:xfrm>
+            <a:off x="970470" y="1626965"/>
+            <a:ext cx="1725285" cy="457199"/>
+          </a:xfrm>
+          <a:prstGeom prst="roundRect">
+            <a:avLst/>
+          </a:prstGeom>
+        </p:spPr>
+        <p:style>
+          <a:lnRef idx="1">
+            <a:schemeClr val="accent3"/>
+          </a:lnRef>
+          <a:fillRef idx="2">
+            <a:schemeClr val="accent3"/>
+          </a:fillRef>
+          <a:effectRef idx="1">
+            <a:schemeClr val="accent3"/>
+          </a:effectRef>
+          <a:fontRef idx="minor">
+            <a:schemeClr val="dk1"/>
+          </a:fontRef>
+        </p:style>
+        <p:txBody>
+          <a:bodyPr rtlCol="0" anchor="ctr"/>
+          <a:lstStyle/>
+          <a:p>
+            <a:pPr algn="ctr"/>
+            <a:r>
+              <a:rPr lang="nb-NO" sz="1200" dirty="0" err="1" smtClean="0"/>
+              <a:t>EmployeeRecords</a:t>
+            </a:r>
+            <a:r>
+              <a:rPr lang="nb-NO" sz="1200" dirty="0" smtClean="0"/>
+              <a:t> API</a:t>
+            </a:r>
+            <a:endParaRPr lang="en-US" sz="1200" dirty="0"/>
+          </a:p>
+        </p:txBody>
+      </p:sp>
+      <p:sp>
+        <p:nvSpPr>
+          <p:cNvPr id="7" name="Can 6"/>
+          <p:cNvSpPr/>
+          <p:nvPr/>
+        </p:nvSpPr>
+        <p:spPr>
+          <a:xfrm>
+            <a:off x="1324152" y="2710119"/>
+            <a:ext cx="1017919" cy="629728"/>
+          </a:xfrm>
+          <a:prstGeom prst="can">
+            <a:avLst/>
+          </a:prstGeom>
+        </p:spPr>
+        <p:style>
+          <a:lnRef idx="2">
+            <a:schemeClr val="accent1">
+              <a:shade val="50000"/>
+            </a:schemeClr>
+          </a:lnRef>
+          <a:fillRef idx="1">
+            <a:schemeClr val="accent1"/>
+          </a:fillRef>
+          <a:effectRef idx="0">
+            <a:schemeClr val="accent1"/>
+          </a:effectRef>
+          <a:fontRef idx="minor">
+            <a:schemeClr val="lt1"/>
+          </a:fontRef>
+        </p:style>
+        <p:txBody>
+          <a:bodyPr rtlCol="0" anchor="ctr"/>
+          <a:lstStyle/>
+          <a:p>
+            <a:pPr algn="ctr"/>
+            <a:r>
+              <a:rPr lang="nb-NO" sz="1200" dirty="0" err="1" smtClean="0"/>
+              <a:t>Employees</a:t>
+            </a:r>
+            <a:endParaRPr lang="en-US" sz="1200" dirty="0"/>
+          </a:p>
+        </p:txBody>
+      </p:sp>
+      <p:cxnSp>
+        <p:nvCxnSpPr>
+          <p:cNvPr id="8" name="Straight Arrow Connector 7"/>
+          <p:cNvCxnSpPr>
+            <a:stCxn id="5" idx="2"/>
+            <a:endCxn id="6" idx="0"/>
+          </p:cNvCxnSpPr>
+          <p:nvPr/>
+        </p:nvCxnSpPr>
+        <p:spPr>
+          <a:xfrm flipH="1">
+            <a:off x="1833113" y="1143885"/>
+            <a:ext cx="1" cy="483080"/>
+          </a:xfrm>
+          <a:prstGeom prst="straightConnector1">
+            <a:avLst/>
+          </a:prstGeom>
+          <a:ln>
+            <a:tailEnd type="triangle"/>
+          </a:ln>
+        </p:spPr>
+        <p:style>
+          <a:lnRef idx="3">
+            <a:schemeClr val="accent3"/>
+          </a:lnRef>
+          <a:fillRef idx="0">
+            <a:schemeClr val="accent3"/>
+          </a:fillRef>
+          <a:effectRef idx="2">
+            <a:schemeClr val="accent3"/>
+          </a:effectRef>
+          <a:fontRef idx="minor">
+            <a:schemeClr val="tx1"/>
+          </a:fontRef>
+        </p:style>
+      </p:cxnSp>
+      <p:cxnSp>
+        <p:nvCxnSpPr>
+          <p:cNvPr id="9" name="Straight Arrow Connector 8"/>
+          <p:cNvCxnSpPr>
+            <a:stCxn id="6" idx="2"/>
+            <a:endCxn id="7" idx="1"/>
+          </p:cNvCxnSpPr>
+          <p:nvPr/>
+        </p:nvCxnSpPr>
+        <p:spPr>
+          <a:xfrm flipH="1">
+            <a:off x="1833112" y="2084164"/>
+            <a:ext cx="1" cy="625955"/>
+          </a:xfrm>
+          <a:prstGeom prst="straightConnector1">
+            <a:avLst/>
+          </a:prstGeom>
+          <a:ln>
+            <a:tailEnd type="triangle"/>
+          </a:ln>
+        </p:spPr>
+        <p:style>
+          <a:lnRef idx="3">
+            <a:schemeClr val="accent3"/>
+          </a:lnRef>
+          <a:fillRef idx="0">
+            <a:schemeClr val="accent3"/>
+          </a:fillRef>
+          <a:effectRef idx="2">
+            <a:schemeClr val="accent3"/>
+          </a:effectRef>
+          <a:fontRef idx="minor">
+            <a:schemeClr val="tx1"/>
+          </a:fontRef>
+        </p:style>
+      </p:cxnSp>
+      <p:sp>
+        <p:nvSpPr>
+          <p:cNvPr id="10" name="Rounded Rectangle 9"/>
+          <p:cNvSpPr/>
+          <p:nvPr/>
+        </p:nvSpPr>
+        <p:spPr>
+          <a:xfrm>
+            <a:off x="5052200" y="1566573"/>
+            <a:ext cx="1457865" cy="543464"/>
+          </a:xfrm>
+          <a:prstGeom prst="roundRect">
+            <a:avLst/>
+          </a:prstGeom>
+          <a:solidFill>
+            <a:schemeClr val="bg1">
+              <a:lumMod val="50000"/>
+            </a:schemeClr>
+          </a:solidFill>
+        </p:spPr>
+        <p:style>
+          <a:lnRef idx="2">
+            <a:schemeClr val="accent3">
+              <a:shade val="50000"/>
+            </a:schemeClr>
+          </a:lnRef>
+          <a:fillRef idx="1">
+            <a:schemeClr val="accent3"/>
+          </a:fillRef>
+          <a:effectRef idx="0">
+            <a:schemeClr val="accent3"/>
+          </a:effectRef>
+          <a:fontRef idx="minor">
+            <a:schemeClr val="lt1"/>
+          </a:fontRef>
+        </p:style>
+        <p:txBody>
+          <a:bodyPr rtlCol="0" anchor="ctr"/>
+          <a:lstStyle/>
+          <a:p>
+            <a:pPr algn="ctr"/>
+            <a:r>
+              <a:rPr lang="nb-NO" sz="1200" dirty="0" err="1" smtClean="0"/>
+              <a:t>ResourcePlanning</a:t>
+            </a:r>
+            <a:endParaRPr lang="en-US" sz="1200" dirty="0"/>
+          </a:p>
+        </p:txBody>
+      </p:sp>
+      <p:sp>
+        <p:nvSpPr>
+          <p:cNvPr id="11" name="Rounded Rectangle 10"/>
+          <p:cNvSpPr/>
+          <p:nvPr/>
+        </p:nvSpPr>
+        <p:spPr>
+          <a:xfrm>
+            <a:off x="4918489" y="3329774"/>
+            <a:ext cx="1725285" cy="457199"/>
+          </a:xfrm>
+          <a:prstGeom prst="roundRect">
+            <a:avLst/>
+          </a:prstGeom>
+        </p:spPr>
+        <p:style>
+          <a:lnRef idx="1">
+            <a:schemeClr val="accent3"/>
+          </a:lnRef>
+          <a:fillRef idx="2">
+            <a:schemeClr val="accent3"/>
+          </a:fillRef>
+          <a:effectRef idx="1">
+            <a:schemeClr val="accent3"/>
+          </a:effectRef>
+          <a:fontRef idx="minor">
+            <a:schemeClr val="dk1"/>
+          </a:fontRef>
+        </p:style>
+        <p:txBody>
+          <a:bodyPr rtlCol="0" anchor="ctr"/>
+          <a:lstStyle/>
+          <a:p>
+            <a:pPr algn="ctr"/>
+            <a:r>
+              <a:rPr lang="nb-NO" sz="1200" dirty="0" err="1" smtClean="0"/>
+              <a:t>ResourcePlanning</a:t>
+            </a:r>
+            <a:r>
+              <a:rPr lang="nb-NO" sz="1200" dirty="0" smtClean="0"/>
+              <a:t> API</a:t>
+            </a:r>
+            <a:endParaRPr lang="en-US" sz="1200" dirty="0"/>
+          </a:p>
+        </p:txBody>
+      </p:sp>
+      <p:sp>
+        <p:nvSpPr>
+          <p:cNvPr id="12" name="Can 11"/>
+          <p:cNvSpPr/>
+          <p:nvPr/>
+        </p:nvSpPr>
+        <p:spPr>
+          <a:xfrm>
+            <a:off x="5203879" y="4270053"/>
+            <a:ext cx="1154504" cy="629728"/>
+          </a:xfrm>
+          <a:prstGeom prst="can">
+            <a:avLst/>
+          </a:prstGeom>
+        </p:spPr>
+        <p:style>
+          <a:lnRef idx="2">
+            <a:schemeClr val="accent1">
+              <a:shade val="50000"/>
+            </a:schemeClr>
+          </a:lnRef>
+          <a:fillRef idx="1">
+            <a:schemeClr val="accent1"/>
+          </a:fillRef>
+          <a:effectRef idx="0">
+            <a:schemeClr val="accent1"/>
+          </a:effectRef>
+          <a:fontRef idx="minor">
+            <a:schemeClr val="lt1"/>
+          </a:fontRef>
+        </p:style>
+        <p:txBody>
+          <a:bodyPr rtlCol="0" anchor="ctr"/>
+          <a:lstStyle/>
+          <a:p>
+            <a:pPr algn="ctr"/>
+            <a:r>
+              <a:rPr lang="nb-NO" sz="1200" dirty="0" err="1" smtClean="0"/>
+              <a:t>ResourcePlans</a:t>
+            </a:r>
+            <a:endParaRPr lang="en-US" sz="1200" dirty="0"/>
+          </a:p>
+        </p:txBody>
+      </p:sp>
+      <p:cxnSp>
+        <p:nvCxnSpPr>
+          <p:cNvPr id="13" name="Straight Arrow Connector 12"/>
+          <p:cNvCxnSpPr>
+            <a:stCxn id="11" idx="2"/>
+            <a:endCxn id="12" idx="1"/>
+          </p:cNvCxnSpPr>
+          <p:nvPr/>
+        </p:nvCxnSpPr>
+        <p:spPr>
+          <a:xfrm flipH="1">
+            <a:off x="5781131" y="3786973"/>
+            <a:ext cx="1" cy="483080"/>
+          </a:xfrm>
+          <a:prstGeom prst="straightConnector1">
+            <a:avLst/>
+          </a:prstGeom>
+          <a:ln>
+            <a:tailEnd type="triangle"/>
+          </a:ln>
+        </p:spPr>
+        <p:style>
+          <a:lnRef idx="3">
+            <a:schemeClr val="accent3"/>
+          </a:lnRef>
+          <a:fillRef idx="0">
+            <a:schemeClr val="accent3"/>
+          </a:fillRef>
+          <a:effectRef idx="2">
+            <a:schemeClr val="accent3"/>
+          </a:effectRef>
+          <a:fontRef idx="minor">
+            <a:schemeClr val="tx1"/>
+          </a:fontRef>
+        </p:style>
+      </p:cxnSp>
+      <p:sp>
+        <p:nvSpPr>
+          <p:cNvPr id="14" name="Rounded Rectangle 13"/>
+          <p:cNvSpPr/>
+          <p:nvPr/>
+        </p:nvSpPr>
+        <p:spPr>
+          <a:xfrm>
+            <a:off x="10092218" y="1609705"/>
+            <a:ext cx="1846055" cy="457199"/>
+          </a:xfrm>
+          <a:prstGeom prst="roundRect">
+            <a:avLst/>
+          </a:prstGeom>
+        </p:spPr>
+        <p:style>
+          <a:lnRef idx="1">
+            <a:schemeClr val="accent3"/>
+          </a:lnRef>
+          <a:fillRef idx="2">
+            <a:schemeClr val="accent3"/>
+          </a:fillRef>
+          <a:effectRef idx="1">
+            <a:schemeClr val="accent3"/>
+          </a:effectRef>
+          <a:fontRef idx="minor">
+            <a:schemeClr val="dk1"/>
+          </a:fontRef>
+        </p:style>
+        <p:txBody>
+          <a:bodyPr rtlCol="0" anchor="ctr"/>
+          <a:lstStyle/>
+          <a:p>
+            <a:pPr algn="ctr"/>
+            <a:r>
+              <a:rPr lang="nb-NO" sz="1200" dirty="0" err="1" smtClean="0"/>
+              <a:t>CapacityCalculations</a:t>
+            </a:r>
+            <a:r>
+              <a:rPr lang="nb-NO" sz="1200" dirty="0" smtClean="0"/>
+              <a:t> API</a:t>
+            </a:r>
+            <a:endParaRPr lang="en-US" sz="1200" dirty="0"/>
+          </a:p>
+        </p:txBody>
+      </p:sp>
+      <p:sp>
+        <p:nvSpPr>
+          <p:cNvPr id="15" name="Rounded Rectangle 14"/>
+          <p:cNvSpPr/>
+          <p:nvPr/>
+        </p:nvSpPr>
+        <p:spPr>
+          <a:xfrm>
+            <a:off x="9432305" y="3879511"/>
+            <a:ext cx="1457865" cy="543464"/>
+          </a:xfrm>
+          <a:prstGeom prst="roundRect">
+            <a:avLst/>
+          </a:prstGeom>
+          <a:solidFill>
+            <a:schemeClr val="bg1">
+              <a:lumMod val="50000"/>
+            </a:schemeClr>
+          </a:solidFill>
+        </p:spPr>
+        <p:style>
+          <a:lnRef idx="2">
+            <a:schemeClr val="accent3">
+              <a:shade val="50000"/>
+            </a:schemeClr>
+          </a:lnRef>
+          <a:fillRef idx="1">
+            <a:schemeClr val="accent3"/>
+          </a:fillRef>
+          <a:effectRef idx="0">
+            <a:schemeClr val="accent3"/>
+          </a:effectRef>
+          <a:fontRef idx="minor">
+            <a:schemeClr val="lt1"/>
+          </a:fontRef>
+        </p:style>
+        <p:txBody>
+          <a:bodyPr rtlCol="0" anchor="ctr"/>
+          <a:lstStyle/>
+          <a:p>
+            <a:pPr algn="ctr"/>
+            <a:r>
+              <a:rPr lang="nb-NO" sz="1200" dirty="0" smtClean="0"/>
+              <a:t>Reports</a:t>
+            </a:r>
+            <a:endParaRPr lang="en-US" sz="1200" dirty="0"/>
+          </a:p>
+        </p:txBody>
+      </p:sp>
+      <p:sp>
+        <p:nvSpPr>
+          <p:cNvPr id="16" name="Rounded Rectangle 15"/>
+          <p:cNvSpPr/>
+          <p:nvPr/>
+        </p:nvSpPr>
+        <p:spPr>
+          <a:xfrm>
+            <a:off x="9298596" y="4925480"/>
+            <a:ext cx="1725285" cy="457199"/>
+          </a:xfrm>
+          <a:prstGeom prst="roundRect">
+            <a:avLst/>
+          </a:prstGeom>
+        </p:spPr>
+        <p:style>
+          <a:lnRef idx="1">
+            <a:schemeClr val="accent3"/>
+          </a:lnRef>
+          <a:fillRef idx="2">
+            <a:schemeClr val="accent3"/>
+          </a:fillRef>
+          <a:effectRef idx="1">
+            <a:schemeClr val="accent3"/>
+          </a:effectRef>
+          <a:fontRef idx="minor">
+            <a:schemeClr val="dk1"/>
+          </a:fontRef>
+        </p:style>
+        <p:txBody>
+          <a:bodyPr rtlCol="0" anchor="ctr"/>
+          <a:lstStyle/>
+          <a:p>
+            <a:pPr algn="ctr"/>
+            <a:r>
+              <a:rPr lang="nb-NO" sz="1200" dirty="0" smtClean="0"/>
+              <a:t>Reports API</a:t>
+            </a:r>
+            <a:endParaRPr lang="en-US" sz="1200" dirty="0"/>
+          </a:p>
+        </p:txBody>
+      </p:sp>
+      <p:sp>
+        <p:nvSpPr>
+          <p:cNvPr id="17" name="Can 16"/>
+          <p:cNvSpPr/>
+          <p:nvPr/>
+        </p:nvSpPr>
+        <p:spPr>
+          <a:xfrm>
+            <a:off x="9583988" y="5856425"/>
+            <a:ext cx="1154504" cy="629728"/>
+          </a:xfrm>
+          <a:prstGeom prst="can">
+            <a:avLst/>
+          </a:prstGeom>
+        </p:spPr>
+        <p:style>
+          <a:lnRef idx="2">
+            <a:schemeClr val="accent1">
+              <a:shade val="50000"/>
+            </a:schemeClr>
+          </a:lnRef>
+          <a:fillRef idx="1">
+            <a:schemeClr val="accent1"/>
+          </a:fillRef>
+          <a:effectRef idx="0">
+            <a:schemeClr val="accent1"/>
+          </a:effectRef>
+          <a:fontRef idx="minor">
+            <a:schemeClr val="lt1"/>
+          </a:fontRef>
+        </p:style>
+        <p:txBody>
+          <a:bodyPr rtlCol="0" anchor="ctr"/>
+          <a:lstStyle/>
+          <a:p>
+            <a:pPr algn="ctr"/>
+            <a:r>
+              <a:rPr lang="nb-NO" sz="1200" dirty="0" smtClean="0"/>
+              <a:t>Reports</a:t>
+            </a:r>
+            <a:endParaRPr lang="en-US" sz="1200" dirty="0"/>
+          </a:p>
+        </p:txBody>
+      </p:sp>
+      <p:cxnSp>
+        <p:nvCxnSpPr>
+          <p:cNvPr id="18" name="Straight Arrow Connector 17"/>
+          <p:cNvCxnSpPr>
+            <a:stCxn id="15" idx="2"/>
+            <a:endCxn id="16" idx="0"/>
+          </p:cNvCxnSpPr>
+          <p:nvPr/>
+        </p:nvCxnSpPr>
+        <p:spPr>
+          <a:xfrm>
+            <a:off x="10161238" y="4422975"/>
+            <a:ext cx="1" cy="502505"/>
+          </a:xfrm>
+          <a:prstGeom prst="straightConnector1">
+            <a:avLst/>
+          </a:prstGeom>
+          <a:ln>
+            <a:tailEnd type="triangle"/>
+          </a:ln>
+        </p:spPr>
+        <p:style>
+          <a:lnRef idx="3">
+            <a:schemeClr val="accent3"/>
+          </a:lnRef>
+          <a:fillRef idx="0">
+            <a:schemeClr val="accent3"/>
+          </a:fillRef>
+          <a:effectRef idx="2">
+            <a:schemeClr val="accent3"/>
+          </a:effectRef>
+          <a:fontRef idx="minor">
+            <a:schemeClr val="tx1"/>
+          </a:fontRef>
+        </p:style>
+      </p:cxnSp>
+      <p:cxnSp>
+        <p:nvCxnSpPr>
+          <p:cNvPr id="19" name="Straight Arrow Connector 18"/>
+          <p:cNvCxnSpPr>
+            <a:stCxn id="16" idx="2"/>
+            <a:endCxn id="17" idx="1"/>
+          </p:cNvCxnSpPr>
+          <p:nvPr/>
+        </p:nvCxnSpPr>
+        <p:spPr>
+          <a:xfrm>
+            <a:off x="10161239" y="5382679"/>
+            <a:ext cx="1" cy="473746"/>
+          </a:xfrm>
+          <a:prstGeom prst="straightConnector1">
+            <a:avLst/>
+          </a:prstGeom>
+          <a:ln>
+            <a:tailEnd type="triangle"/>
+          </a:ln>
+        </p:spPr>
+        <p:style>
+          <a:lnRef idx="3">
+            <a:schemeClr val="accent3"/>
+          </a:lnRef>
+          <a:fillRef idx="0">
+            <a:schemeClr val="accent3"/>
+          </a:fillRef>
+          <a:effectRef idx="2">
+            <a:schemeClr val="accent3"/>
+          </a:effectRef>
+          <a:fontRef idx="minor">
+            <a:schemeClr val="tx1"/>
+          </a:fontRef>
+        </p:style>
+      </p:cxnSp>
+      <p:cxnSp>
+        <p:nvCxnSpPr>
+          <p:cNvPr id="20" name="Straight Arrow Connector 19"/>
+          <p:cNvCxnSpPr>
+            <a:stCxn id="6" idx="3"/>
+            <a:endCxn id="10" idx="1"/>
+          </p:cNvCxnSpPr>
+          <p:nvPr/>
+        </p:nvCxnSpPr>
+        <p:spPr>
+          <a:xfrm flipV="1">
+            <a:off x="2695755" y="1838305"/>
+            <a:ext cx="2356445" cy="17260"/>
+          </a:xfrm>
+          <a:prstGeom prst="straightConnector1">
+            <a:avLst/>
+          </a:prstGeom>
+          <a:ln>
+            <a:tailEnd type="triangle"/>
+          </a:ln>
+          <a:effectLst>
+            <a:outerShdw blurRad="50800" dist="38100" dir="2700000" algn="tl" rotWithShape="0">
+              <a:prstClr val="black">
+                <a:alpha val="40000"/>
+              </a:prstClr>
+            </a:outerShdw>
+          </a:effectLst>
+        </p:spPr>
+        <p:style>
+          <a:lnRef idx="3">
+            <a:schemeClr val="accent2"/>
+          </a:lnRef>
+          <a:fillRef idx="0">
+            <a:schemeClr val="accent2"/>
+          </a:fillRef>
+          <a:effectRef idx="2">
+            <a:schemeClr val="accent2"/>
+          </a:effectRef>
+          <a:fontRef idx="minor">
+            <a:schemeClr val="tx1"/>
+          </a:fontRef>
+        </p:style>
+      </p:cxnSp>
+      <p:sp>
+        <p:nvSpPr>
+          <p:cNvPr id="21" name="TextBox 20"/>
+          <p:cNvSpPr txBox="1"/>
+          <p:nvPr/>
+        </p:nvSpPr>
+        <p:spPr>
+          <a:xfrm>
+            <a:off x="3274442" y="1308505"/>
+            <a:ext cx="1165511" cy="461665"/>
+          </a:xfrm>
+          <a:prstGeom prst="rect">
+            <a:avLst/>
+          </a:prstGeom>
+          <a:noFill/>
+        </p:spPr>
+        <p:txBody>
+          <a:bodyPr wrap="none" rtlCol="0">
+            <a:spAutoFit/>
+          </a:bodyPr>
+          <a:lstStyle/>
+          <a:p>
+            <a:pPr algn="ctr"/>
+            <a:r>
+              <a:rPr lang="nb-NO" sz="1200" dirty="0" smtClean="0">
+                <a:solidFill>
+                  <a:schemeClr val="accent2">
+                    <a:lumMod val="75000"/>
+                  </a:schemeClr>
+                </a:solidFill>
+              </a:rPr>
+              <a:t>1 </a:t>
+            </a:r>
+            <a:r>
+              <a:rPr lang="nb-NO" sz="1200" dirty="0" smtClean="0">
+                <a:solidFill>
+                  <a:schemeClr val="accent2">
+                    <a:lumMod val="75000"/>
+                  </a:schemeClr>
+                </a:solidFill>
+              </a:rPr>
+              <a:t>– GET </a:t>
+            </a:r>
+          </a:p>
+          <a:p>
+            <a:pPr algn="ctr"/>
+            <a:r>
+              <a:rPr lang="nb-NO" sz="1200" dirty="0" smtClean="0">
+                <a:solidFill>
+                  <a:schemeClr val="accent2">
+                    <a:lumMod val="75000"/>
+                  </a:schemeClr>
+                </a:solidFill>
+              </a:rPr>
+              <a:t>/</a:t>
+            </a:r>
+            <a:r>
+              <a:rPr lang="nb-NO" sz="1200" dirty="0" err="1" smtClean="0">
+                <a:solidFill>
+                  <a:schemeClr val="accent2">
+                    <a:lumMod val="75000"/>
+                  </a:schemeClr>
+                </a:solidFill>
+              </a:rPr>
+              <a:t>api</a:t>
+            </a:r>
+            <a:r>
+              <a:rPr lang="nb-NO" sz="1200" dirty="0" smtClean="0">
+                <a:solidFill>
+                  <a:schemeClr val="accent2">
+                    <a:lumMod val="75000"/>
+                  </a:schemeClr>
+                </a:solidFill>
+              </a:rPr>
+              <a:t>/</a:t>
+            </a:r>
+            <a:r>
+              <a:rPr lang="nb-NO" sz="1200" dirty="0" err="1" smtClean="0">
+                <a:solidFill>
+                  <a:schemeClr val="accent2">
+                    <a:lumMod val="75000"/>
+                  </a:schemeClr>
+                </a:solidFill>
+              </a:rPr>
+              <a:t>employees</a:t>
+            </a:r>
+            <a:endParaRPr lang="en-US" sz="1200" dirty="0">
+              <a:solidFill>
+                <a:schemeClr val="accent2">
+                  <a:lumMod val="75000"/>
+                </a:schemeClr>
+              </a:solidFill>
+            </a:endParaRPr>
+          </a:p>
+        </p:txBody>
+      </p:sp>
+      <p:cxnSp>
+        <p:nvCxnSpPr>
+          <p:cNvPr id="22" name="Straight Arrow Connector 21"/>
+          <p:cNvCxnSpPr>
+            <a:stCxn id="10" idx="2"/>
+            <a:endCxn id="11" idx="0"/>
+          </p:cNvCxnSpPr>
+          <p:nvPr/>
+        </p:nvCxnSpPr>
+        <p:spPr>
+          <a:xfrm flipH="1">
+            <a:off x="5781132" y="2110037"/>
+            <a:ext cx="1" cy="1219737"/>
+          </a:xfrm>
+          <a:prstGeom prst="straightConnector1">
+            <a:avLst/>
+          </a:prstGeom>
+          <a:ln>
+            <a:tailEnd type="triangle"/>
+          </a:ln>
+          <a:effectLst>
+            <a:outerShdw blurRad="50800" dist="38100" dir="2700000" algn="tl" rotWithShape="0">
+              <a:prstClr val="black">
+                <a:alpha val="40000"/>
+              </a:prstClr>
+            </a:outerShdw>
+          </a:effectLst>
+        </p:spPr>
+        <p:style>
+          <a:lnRef idx="3">
+            <a:schemeClr val="accent2"/>
+          </a:lnRef>
+          <a:fillRef idx="0">
+            <a:schemeClr val="accent2"/>
+          </a:fillRef>
+          <a:effectRef idx="2">
+            <a:schemeClr val="accent2"/>
+          </a:effectRef>
+          <a:fontRef idx="minor">
+            <a:schemeClr val="tx1"/>
+          </a:fontRef>
+        </p:style>
+      </p:cxnSp>
+      <p:sp>
+        <p:nvSpPr>
+          <p:cNvPr id="23" name="TextBox 22"/>
+          <p:cNvSpPr txBox="1"/>
+          <p:nvPr/>
+        </p:nvSpPr>
+        <p:spPr>
+          <a:xfrm>
+            <a:off x="4009753" y="2532737"/>
+            <a:ext cx="3523706" cy="461665"/>
+          </a:xfrm>
+          <a:prstGeom prst="rect">
+            <a:avLst/>
+          </a:prstGeom>
+          <a:solidFill>
+            <a:schemeClr val="bg1"/>
+          </a:solidFill>
+        </p:spPr>
+        <p:txBody>
+          <a:bodyPr wrap="square" rtlCol="0">
+            <a:spAutoFit/>
+          </a:bodyPr>
+          <a:lstStyle/>
+          <a:p>
+            <a:r>
+              <a:rPr lang="nb-NO" sz="1200" dirty="0" smtClean="0">
+                <a:solidFill>
+                  <a:schemeClr val="accent2">
+                    <a:lumMod val="75000"/>
+                  </a:schemeClr>
+                </a:solidFill>
+              </a:rPr>
+              <a:t>2 – POST </a:t>
+            </a:r>
+            <a:r>
+              <a:rPr lang="nb-NO" sz="1200" dirty="0" err="1" smtClean="0">
+                <a:solidFill>
+                  <a:schemeClr val="accent2">
+                    <a:lumMod val="75000"/>
+                  </a:schemeClr>
+                </a:solidFill>
+              </a:rPr>
+              <a:t>ResourcePlan</a:t>
+            </a:r>
+            <a:r>
+              <a:rPr lang="nb-NO" sz="1200" dirty="0" smtClean="0">
+                <a:solidFill>
+                  <a:schemeClr val="accent2">
+                    <a:lumMod val="75000"/>
+                  </a:schemeClr>
+                </a:solidFill>
+              </a:rPr>
+              <a:t> </a:t>
+            </a:r>
+          </a:p>
+          <a:p>
+            <a:r>
+              <a:rPr lang="nb-NO" sz="1200" dirty="0" smtClean="0">
+                <a:solidFill>
+                  <a:schemeClr val="accent2">
+                    <a:lumMod val="75000"/>
+                  </a:schemeClr>
+                </a:solidFill>
+              </a:rPr>
+              <a:t>/</a:t>
+            </a:r>
+            <a:r>
+              <a:rPr lang="nb-NO" sz="1200" dirty="0" err="1" smtClean="0">
+                <a:solidFill>
+                  <a:schemeClr val="accent2">
+                    <a:lumMod val="75000"/>
+                  </a:schemeClr>
+                </a:solidFill>
+              </a:rPr>
+              <a:t>api</a:t>
+            </a:r>
+            <a:r>
+              <a:rPr lang="nb-NO" sz="1200" dirty="0" smtClean="0">
+                <a:solidFill>
+                  <a:schemeClr val="accent2">
+                    <a:lumMod val="75000"/>
+                  </a:schemeClr>
+                </a:solidFill>
+              </a:rPr>
+              <a:t>/</a:t>
+            </a:r>
+            <a:r>
+              <a:rPr lang="nb-NO" sz="1200" dirty="0" err="1" smtClean="0">
+                <a:solidFill>
+                  <a:schemeClr val="accent2">
+                    <a:lumMod val="75000"/>
+                  </a:schemeClr>
+                </a:solidFill>
+              </a:rPr>
+              <a:t>resourceplanning</a:t>
+            </a:r>
+            <a:r>
+              <a:rPr lang="nb-NO" sz="1200" dirty="0" smtClean="0">
+                <a:solidFill>
+                  <a:schemeClr val="accent2">
+                    <a:lumMod val="75000"/>
+                  </a:schemeClr>
+                </a:solidFill>
+              </a:rPr>
+              <a:t>/plan/</a:t>
+            </a:r>
+            <a:r>
+              <a:rPr lang="nb-NO" sz="1200" dirty="0" err="1" smtClean="0">
+                <a:solidFill>
+                  <a:schemeClr val="accent2">
+                    <a:lumMod val="75000"/>
+                  </a:schemeClr>
+                </a:solidFill>
+              </a:rPr>
+              <a:t>employee</a:t>
+            </a:r>
+            <a:r>
+              <a:rPr lang="nb-NO" sz="1200" dirty="0" smtClean="0">
+                <a:solidFill>
+                  <a:schemeClr val="accent2">
+                    <a:lumMod val="75000"/>
+                  </a:schemeClr>
+                </a:solidFill>
+              </a:rPr>
+              <a:t>/{</a:t>
+            </a:r>
+            <a:r>
+              <a:rPr lang="nb-NO" sz="1200" dirty="0" err="1" smtClean="0">
+                <a:solidFill>
+                  <a:schemeClr val="accent2">
+                    <a:lumMod val="75000"/>
+                  </a:schemeClr>
+                </a:solidFill>
+              </a:rPr>
+              <a:t>employeeId</a:t>
+            </a:r>
+            <a:r>
+              <a:rPr lang="nb-NO" sz="1200" dirty="0" smtClean="0">
+                <a:solidFill>
+                  <a:schemeClr val="accent2">
+                    <a:lumMod val="75000"/>
+                  </a:schemeClr>
+                </a:solidFill>
+              </a:rPr>
+              <a:t>}</a:t>
+            </a:r>
+            <a:endParaRPr lang="en-US" sz="1200" dirty="0">
+              <a:solidFill>
+                <a:schemeClr val="accent2">
+                  <a:lumMod val="75000"/>
+                </a:schemeClr>
+              </a:solidFill>
+            </a:endParaRPr>
+          </a:p>
+        </p:txBody>
+      </p:sp>
+      <p:cxnSp>
+        <p:nvCxnSpPr>
+          <p:cNvPr id="24" name="Straight Arrow Connector 23"/>
+          <p:cNvCxnSpPr>
+            <a:stCxn id="10" idx="3"/>
+            <a:endCxn id="14" idx="1"/>
+          </p:cNvCxnSpPr>
+          <p:nvPr/>
+        </p:nvCxnSpPr>
+        <p:spPr>
+          <a:xfrm>
+            <a:off x="6510065" y="1838305"/>
+            <a:ext cx="3582153" cy="0"/>
+          </a:xfrm>
+          <a:prstGeom prst="straightConnector1">
+            <a:avLst/>
+          </a:prstGeom>
+          <a:ln>
+            <a:tailEnd type="triangle"/>
+          </a:ln>
+          <a:effectLst>
+            <a:outerShdw blurRad="50800" dist="38100" dir="2700000" algn="tl" rotWithShape="0">
+              <a:prstClr val="black">
+                <a:alpha val="40000"/>
+              </a:prstClr>
+            </a:outerShdw>
+          </a:effectLst>
+        </p:spPr>
+        <p:style>
+          <a:lnRef idx="3">
+            <a:schemeClr val="accent2"/>
+          </a:lnRef>
+          <a:fillRef idx="0">
+            <a:schemeClr val="accent2"/>
+          </a:fillRef>
+          <a:effectRef idx="2">
+            <a:schemeClr val="accent2"/>
+          </a:effectRef>
+          <a:fontRef idx="minor">
+            <a:schemeClr val="tx1"/>
+          </a:fontRef>
+        </p:style>
+      </p:cxnSp>
+      <p:sp>
+        <p:nvSpPr>
+          <p:cNvPr id="25" name="TextBox 24"/>
+          <p:cNvSpPr txBox="1"/>
+          <p:nvPr/>
+        </p:nvSpPr>
+        <p:spPr>
+          <a:xfrm>
+            <a:off x="7112919" y="1308506"/>
+            <a:ext cx="2747074" cy="461665"/>
+          </a:xfrm>
+          <a:prstGeom prst="rect">
+            <a:avLst/>
+          </a:prstGeom>
+          <a:noFill/>
+        </p:spPr>
+        <p:txBody>
+          <a:bodyPr wrap="square" rtlCol="0">
+            <a:spAutoFit/>
+          </a:bodyPr>
+          <a:lstStyle/>
+          <a:p>
+            <a:r>
+              <a:rPr lang="nb-NO" sz="1200" dirty="0" smtClean="0">
+                <a:solidFill>
+                  <a:schemeClr val="accent2">
+                    <a:lumMod val="75000"/>
+                  </a:schemeClr>
+                </a:solidFill>
+              </a:rPr>
+              <a:t>3 – POST </a:t>
+            </a:r>
+            <a:r>
+              <a:rPr lang="nb-NO" sz="1200" dirty="0" err="1" smtClean="0">
+                <a:solidFill>
+                  <a:schemeClr val="accent2">
+                    <a:lumMod val="75000"/>
+                  </a:schemeClr>
+                </a:solidFill>
+              </a:rPr>
+              <a:t>ResourcePlan</a:t>
+            </a:r>
+            <a:r>
+              <a:rPr lang="nb-NO" sz="1200" dirty="0" smtClean="0">
+                <a:solidFill>
+                  <a:schemeClr val="accent2">
+                    <a:lumMod val="75000"/>
+                  </a:schemeClr>
+                </a:solidFill>
+              </a:rPr>
+              <a:t> </a:t>
+            </a:r>
+          </a:p>
+          <a:p>
+            <a:r>
+              <a:rPr lang="nb-NO" sz="1200" dirty="0" smtClean="0">
+                <a:solidFill>
+                  <a:schemeClr val="accent2">
+                    <a:lumMod val="75000"/>
+                  </a:schemeClr>
+                </a:solidFill>
+              </a:rPr>
+              <a:t>/</a:t>
+            </a:r>
+            <a:r>
+              <a:rPr lang="nb-NO" sz="1200" dirty="0" err="1" smtClean="0">
+                <a:solidFill>
+                  <a:schemeClr val="accent2">
+                    <a:lumMod val="75000"/>
+                  </a:schemeClr>
+                </a:solidFill>
+              </a:rPr>
+              <a:t>api</a:t>
+            </a:r>
+            <a:r>
+              <a:rPr lang="nb-NO" sz="1200" dirty="0" smtClean="0">
+                <a:solidFill>
+                  <a:schemeClr val="accent2">
+                    <a:lumMod val="75000"/>
+                  </a:schemeClr>
+                </a:solidFill>
+              </a:rPr>
+              <a:t>/</a:t>
+            </a:r>
+            <a:r>
+              <a:rPr lang="nb-NO" sz="1200" dirty="0" err="1" smtClean="0">
+                <a:solidFill>
+                  <a:schemeClr val="accent2">
+                    <a:lumMod val="75000"/>
+                  </a:schemeClr>
+                </a:solidFill>
+              </a:rPr>
+              <a:t>calculations</a:t>
+            </a:r>
+            <a:r>
+              <a:rPr lang="nb-NO" sz="1200" dirty="0" smtClean="0">
+                <a:solidFill>
+                  <a:schemeClr val="accent2">
+                    <a:lumMod val="75000"/>
+                  </a:schemeClr>
+                </a:solidFill>
+              </a:rPr>
+              <a:t>/</a:t>
+            </a:r>
+            <a:r>
+              <a:rPr lang="nb-NO" sz="1200" dirty="0" err="1" smtClean="0">
+                <a:solidFill>
+                  <a:schemeClr val="accent2">
+                    <a:lumMod val="75000"/>
+                  </a:schemeClr>
+                </a:solidFill>
+              </a:rPr>
+              <a:t>capacity</a:t>
+            </a:r>
+            <a:r>
+              <a:rPr lang="nb-NO" sz="1200" dirty="0" smtClean="0">
+                <a:solidFill>
+                  <a:schemeClr val="accent2">
+                    <a:lumMod val="75000"/>
+                  </a:schemeClr>
+                </a:solidFill>
+              </a:rPr>
+              <a:t>/</a:t>
+            </a:r>
+            <a:r>
+              <a:rPr lang="nb-NO" sz="1200" dirty="0" err="1" smtClean="0">
+                <a:solidFill>
+                  <a:schemeClr val="accent2">
+                    <a:lumMod val="75000"/>
+                  </a:schemeClr>
+                </a:solidFill>
+              </a:rPr>
+              <a:t>resourceplan</a:t>
+            </a:r>
+            <a:endParaRPr lang="en-US" sz="1200" dirty="0">
+              <a:solidFill>
+                <a:schemeClr val="accent2">
+                  <a:lumMod val="75000"/>
+                </a:schemeClr>
+              </a:solidFill>
+            </a:endParaRPr>
+          </a:p>
+        </p:txBody>
+      </p:sp>
+      <p:sp>
+        <p:nvSpPr>
+          <p:cNvPr id="26" name="TextBox 25"/>
+          <p:cNvSpPr txBox="1"/>
+          <p:nvPr/>
+        </p:nvSpPr>
+        <p:spPr>
+          <a:xfrm>
+            <a:off x="7122312" y="2002867"/>
+            <a:ext cx="3232797" cy="276999"/>
+          </a:xfrm>
+          <a:prstGeom prst="rect">
+            <a:avLst/>
+          </a:prstGeom>
+          <a:noFill/>
+        </p:spPr>
+        <p:txBody>
+          <a:bodyPr wrap="square" rtlCol="0">
+            <a:spAutoFit/>
+          </a:bodyPr>
+          <a:lstStyle/>
+          <a:p>
+            <a:r>
+              <a:rPr lang="nb-NO" sz="1200" dirty="0" smtClean="0">
+                <a:solidFill>
+                  <a:schemeClr val="accent2">
+                    <a:lumMod val="75000"/>
+                  </a:schemeClr>
+                </a:solidFill>
+              </a:rPr>
+              <a:t>4 </a:t>
+            </a:r>
+            <a:r>
+              <a:rPr lang="nb-NO" sz="1200" dirty="0" smtClean="0">
+                <a:solidFill>
+                  <a:schemeClr val="accent2">
+                    <a:lumMod val="75000"/>
+                  </a:schemeClr>
+                </a:solidFill>
+              </a:rPr>
+              <a:t>–</a:t>
+            </a:r>
+            <a:r>
+              <a:rPr lang="nb-NO" sz="1200" dirty="0" smtClean="0">
+                <a:solidFill>
+                  <a:schemeClr val="accent2">
+                    <a:lumMod val="75000"/>
+                  </a:schemeClr>
+                </a:solidFill>
+              </a:rPr>
+              <a:t> </a:t>
+            </a:r>
+            <a:r>
+              <a:rPr lang="nb-NO" sz="1200" dirty="0" err="1" smtClean="0">
+                <a:solidFill>
+                  <a:schemeClr val="accent2">
+                    <a:lumMod val="75000"/>
+                  </a:schemeClr>
+                </a:solidFill>
+              </a:rPr>
+              <a:t>returns</a:t>
+            </a:r>
+            <a:r>
+              <a:rPr lang="nb-NO" sz="1200" dirty="0" smtClean="0">
+                <a:solidFill>
+                  <a:schemeClr val="accent2">
+                    <a:lumMod val="75000"/>
+                  </a:schemeClr>
+                </a:solidFill>
+              </a:rPr>
+              <a:t> 201 </a:t>
+            </a:r>
+            <a:r>
+              <a:rPr lang="nb-NO" sz="1200" dirty="0" err="1" smtClean="0">
+                <a:solidFill>
+                  <a:schemeClr val="accent2">
+                    <a:lumMod val="75000"/>
+                  </a:schemeClr>
+                </a:solidFill>
+              </a:rPr>
+              <a:t>response</a:t>
+            </a:r>
+            <a:r>
+              <a:rPr lang="nb-NO" sz="1200" dirty="0" smtClean="0">
+                <a:solidFill>
+                  <a:schemeClr val="accent2">
+                    <a:lumMod val="75000"/>
+                  </a:schemeClr>
+                </a:solidFill>
+              </a:rPr>
+              <a:t> </a:t>
+            </a:r>
+            <a:r>
+              <a:rPr lang="nb-NO" sz="1200" dirty="0" err="1" smtClean="0">
+                <a:solidFill>
+                  <a:schemeClr val="accent2">
+                    <a:lumMod val="75000"/>
+                  </a:schemeClr>
+                </a:solidFill>
+              </a:rPr>
+              <a:t>with</a:t>
+            </a:r>
+            <a:r>
+              <a:rPr lang="nb-NO" sz="1200" dirty="0" smtClean="0">
+                <a:solidFill>
+                  <a:schemeClr val="accent2">
+                    <a:lumMod val="75000"/>
+                  </a:schemeClr>
+                </a:solidFill>
+              </a:rPr>
+              <a:t> Report</a:t>
+            </a:r>
+            <a:endParaRPr lang="en-US" sz="1200" dirty="0">
+              <a:solidFill>
+                <a:schemeClr val="accent2">
+                  <a:lumMod val="75000"/>
+                </a:schemeClr>
+              </a:solidFill>
+            </a:endParaRPr>
+          </a:p>
+        </p:txBody>
+      </p:sp>
+      <p:cxnSp>
+        <p:nvCxnSpPr>
+          <p:cNvPr id="27" name="Straight Arrow Connector 26"/>
+          <p:cNvCxnSpPr/>
+          <p:nvPr/>
+        </p:nvCxnSpPr>
+        <p:spPr>
+          <a:xfrm flipH="1" flipV="1">
+            <a:off x="6510066" y="1958268"/>
+            <a:ext cx="3582152" cy="7883"/>
+          </a:xfrm>
+          <a:prstGeom prst="straightConnector1">
+            <a:avLst/>
+          </a:prstGeom>
+          <a:ln>
+            <a:tailEnd type="triangle"/>
+          </a:ln>
+          <a:effectLst>
+            <a:outerShdw blurRad="50800" dist="38100" dir="2700000" algn="tl" rotWithShape="0">
+              <a:prstClr val="black">
+                <a:alpha val="40000"/>
+              </a:prstClr>
+            </a:outerShdw>
+          </a:effectLst>
+        </p:spPr>
+        <p:style>
+          <a:lnRef idx="3">
+            <a:schemeClr val="accent2"/>
+          </a:lnRef>
+          <a:fillRef idx="0">
+            <a:schemeClr val="accent2"/>
+          </a:fillRef>
+          <a:effectRef idx="2">
+            <a:schemeClr val="accent2"/>
+          </a:effectRef>
+          <a:fontRef idx="minor">
+            <a:schemeClr val="tx1"/>
+          </a:fontRef>
+        </p:style>
+      </p:cxnSp>
+      <p:cxnSp>
+        <p:nvCxnSpPr>
+          <p:cNvPr id="28" name="Straight Arrow Connector 27"/>
+          <p:cNvCxnSpPr/>
+          <p:nvPr/>
+        </p:nvCxnSpPr>
+        <p:spPr>
+          <a:xfrm>
+            <a:off x="6510064" y="2110037"/>
+            <a:ext cx="2929586" cy="1769474"/>
+          </a:xfrm>
+          <a:prstGeom prst="straightConnector1">
+            <a:avLst/>
+          </a:prstGeom>
+          <a:ln>
+            <a:tailEnd type="triangle"/>
+          </a:ln>
+          <a:effectLst>
+            <a:outerShdw blurRad="50800" dist="38100" dir="2700000" algn="tl" rotWithShape="0">
+              <a:prstClr val="black">
+                <a:alpha val="40000"/>
+              </a:prstClr>
+            </a:outerShdw>
+          </a:effectLst>
+        </p:spPr>
+        <p:style>
+          <a:lnRef idx="3">
+            <a:schemeClr val="accent2"/>
+          </a:lnRef>
+          <a:fillRef idx="0">
+            <a:schemeClr val="accent2"/>
+          </a:fillRef>
+          <a:effectRef idx="2">
+            <a:schemeClr val="accent2"/>
+          </a:effectRef>
+          <a:fontRef idx="minor">
+            <a:schemeClr val="tx1"/>
+          </a:fontRef>
+        </p:style>
+      </p:cxnSp>
+      <p:sp>
+        <p:nvSpPr>
+          <p:cNvPr id="29" name="TextBox 28"/>
+          <p:cNvSpPr txBox="1"/>
+          <p:nvPr/>
+        </p:nvSpPr>
+        <p:spPr>
+          <a:xfrm rot="1867564">
+            <a:off x="7987403" y="2855123"/>
+            <a:ext cx="1232517" cy="461665"/>
+          </a:xfrm>
+          <a:prstGeom prst="rect">
+            <a:avLst/>
+          </a:prstGeom>
+          <a:noFill/>
+        </p:spPr>
+        <p:txBody>
+          <a:bodyPr wrap="none" rtlCol="0">
+            <a:spAutoFit/>
+          </a:bodyPr>
+          <a:lstStyle/>
+          <a:p>
+            <a:r>
+              <a:rPr lang="nb-NO" sz="1200" dirty="0" smtClean="0">
+                <a:solidFill>
+                  <a:schemeClr val="accent2">
+                    <a:lumMod val="75000"/>
+                  </a:schemeClr>
+                </a:solidFill>
+              </a:rPr>
+              <a:t>5 – POST Report </a:t>
+            </a:r>
+          </a:p>
+          <a:p>
+            <a:r>
+              <a:rPr lang="nb-NO" sz="1200" dirty="0" smtClean="0">
+                <a:solidFill>
+                  <a:schemeClr val="accent2">
+                    <a:lumMod val="75000"/>
+                  </a:schemeClr>
+                </a:solidFill>
+              </a:rPr>
+              <a:t>/</a:t>
+            </a:r>
+            <a:r>
+              <a:rPr lang="nb-NO" sz="1200" dirty="0" err="1" smtClean="0">
+                <a:solidFill>
+                  <a:schemeClr val="accent2">
+                    <a:lumMod val="75000"/>
+                  </a:schemeClr>
+                </a:solidFill>
+              </a:rPr>
+              <a:t>api</a:t>
+            </a:r>
+            <a:r>
+              <a:rPr lang="nb-NO" sz="1200" dirty="0" smtClean="0">
+                <a:solidFill>
+                  <a:schemeClr val="accent2">
+                    <a:lumMod val="75000"/>
+                  </a:schemeClr>
+                </a:solidFill>
+              </a:rPr>
+              <a:t>/reports</a:t>
+            </a:r>
+            <a:endParaRPr lang="en-US" sz="1200" dirty="0">
+              <a:solidFill>
+                <a:schemeClr val="accent2">
+                  <a:lumMod val="75000"/>
+                </a:schemeClr>
+              </a:solidFill>
+            </a:endParaRPr>
+          </a:p>
+        </p:txBody>
+      </p:sp>
+      <p:sp>
+        <p:nvSpPr>
+          <p:cNvPr id="30" name="Rounded Rectangle 29"/>
+          <p:cNvSpPr/>
+          <p:nvPr/>
+        </p:nvSpPr>
+        <p:spPr>
+          <a:xfrm>
+            <a:off x="375246" y="4357001"/>
+            <a:ext cx="1457865" cy="543464"/>
+          </a:xfrm>
+          <a:prstGeom prst="roundRect">
+            <a:avLst/>
+          </a:prstGeom>
+          <a:solidFill>
+            <a:schemeClr val="bg1">
+              <a:lumMod val="50000"/>
+            </a:schemeClr>
+          </a:solidFill>
+        </p:spPr>
+        <p:style>
+          <a:lnRef idx="2">
+            <a:schemeClr val="accent3">
+              <a:shade val="50000"/>
+            </a:schemeClr>
+          </a:lnRef>
+          <a:fillRef idx="1">
+            <a:schemeClr val="accent3"/>
+          </a:fillRef>
+          <a:effectRef idx="0">
+            <a:schemeClr val="accent3"/>
+          </a:effectRef>
+          <a:fontRef idx="minor">
+            <a:schemeClr val="lt1"/>
+          </a:fontRef>
+        </p:style>
+        <p:txBody>
+          <a:bodyPr rtlCol="0" anchor="ctr"/>
+          <a:lstStyle/>
+          <a:p>
+            <a:pPr algn="ctr"/>
+            <a:r>
+              <a:rPr lang="nb-NO" sz="1200" dirty="0" smtClean="0"/>
+              <a:t>Web Application</a:t>
+            </a:r>
+            <a:endParaRPr lang="en-US" sz="1200" dirty="0"/>
+          </a:p>
+        </p:txBody>
+      </p:sp>
+      <p:sp>
+        <p:nvSpPr>
+          <p:cNvPr id="31" name="Rounded Rectangle 30"/>
+          <p:cNvSpPr/>
+          <p:nvPr/>
+        </p:nvSpPr>
+        <p:spPr>
+          <a:xfrm>
+            <a:off x="241536" y="5193421"/>
+            <a:ext cx="1725285" cy="457199"/>
+          </a:xfrm>
+          <a:prstGeom prst="roundRect">
+            <a:avLst/>
+          </a:prstGeom>
+        </p:spPr>
+        <p:style>
+          <a:lnRef idx="1">
+            <a:schemeClr val="accent3"/>
+          </a:lnRef>
+          <a:fillRef idx="2">
+            <a:schemeClr val="accent3"/>
+          </a:fillRef>
+          <a:effectRef idx="1">
+            <a:schemeClr val="accent3"/>
+          </a:effectRef>
+          <a:fontRef idx="minor">
+            <a:schemeClr val="dk1"/>
+          </a:fontRef>
+        </p:style>
+        <p:txBody>
+          <a:bodyPr rtlCol="0" anchor="ctr"/>
+          <a:lstStyle/>
+          <a:p>
+            <a:pPr algn="ctr"/>
+            <a:r>
+              <a:rPr lang="nb-NO" sz="1200" dirty="0" smtClean="0"/>
+              <a:t>Web API</a:t>
+            </a:r>
+            <a:endParaRPr lang="en-US" sz="1200" dirty="0"/>
+          </a:p>
+        </p:txBody>
+      </p:sp>
+      <p:sp>
+        <p:nvSpPr>
+          <p:cNvPr id="32" name="Can 31"/>
+          <p:cNvSpPr/>
+          <p:nvPr/>
+        </p:nvSpPr>
+        <p:spPr>
+          <a:xfrm>
+            <a:off x="595221" y="5943576"/>
+            <a:ext cx="1017919" cy="629728"/>
+          </a:xfrm>
+          <a:prstGeom prst="can">
+            <a:avLst/>
+          </a:prstGeom>
+        </p:spPr>
+        <p:style>
+          <a:lnRef idx="2">
+            <a:schemeClr val="accent1">
+              <a:shade val="50000"/>
+            </a:schemeClr>
+          </a:lnRef>
+          <a:fillRef idx="1">
+            <a:schemeClr val="accent1"/>
+          </a:fillRef>
+          <a:effectRef idx="0">
+            <a:schemeClr val="accent1"/>
+          </a:effectRef>
+          <a:fontRef idx="minor">
+            <a:schemeClr val="lt1"/>
+          </a:fontRef>
+        </p:style>
+        <p:txBody>
+          <a:bodyPr rtlCol="0" anchor="ctr"/>
+          <a:lstStyle/>
+          <a:p>
+            <a:pPr algn="ctr"/>
+            <a:r>
+              <a:rPr lang="nb-NO" sz="1200" dirty="0" smtClean="0"/>
+              <a:t>Database</a:t>
+            </a:r>
+            <a:endParaRPr lang="en-US" sz="1200" dirty="0"/>
+          </a:p>
+        </p:txBody>
+      </p:sp>
+      <p:sp>
+        <p:nvSpPr>
+          <p:cNvPr id="33" name="TextBox 32"/>
+          <p:cNvSpPr txBox="1"/>
+          <p:nvPr/>
+        </p:nvSpPr>
+        <p:spPr>
+          <a:xfrm>
+            <a:off x="146649" y="83534"/>
+            <a:ext cx="7168551" cy="369332"/>
+          </a:xfrm>
+          <a:prstGeom prst="rect">
+            <a:avLst/>
+          </a:prstGeom>
+          <a:noFill/>
+        </p:spPr>
+        <p:txBody>
+          <a:bodyPr wrap="square" rtlCol="0">
+            <a:spAutoFit/>
+          </a:bodyPr>
+          <a:lstStyle/>
+          <a:p>
+            <a:r>
+              <a:rPr lang="nb-NO" dirty="0" smtClean="0"/>
+              <a:t>Global </a:t>
+            </a:r>
+            <a:r>
+              <a:rPr lang="nb-NO" dirty="0" err="1" smtClean="0"/>
+              <a:t>Azure</a:t>
+            </a:r>
+            <a:r>
+              <a:rPr lang="nb-NO" dirty="0" smtClean="0"/>
+              <a:t> </a:t>
+            </a:r>
+            <a:r>
+              <a:rPr lang="nb-NO" dirty="0" err="1" smtClean="0"/>
+              <a:t>Bootcamp</a:t>
+            </a:r>
+            <a:r>
+              <a:rPr lang="nb-NO" dirty="0" smtClean="0"/>
+              <a:t> 2016 </a:t>
+            </a:r>
+            <a:r>
+              <a:rPr lang="nb-NO" dirty="0" err="1" smtClean="0"/>
+              <a:t>assignment</a:t>
+            </a:r>
+            <a:r>
+              <a:rPr lang="nb-NO" dirty="0" smtClean="0"/>
+              <a:t> – API-</a:t>
+            </a:r>
+            <a:r>
+              <a:rPr lang="nb-NO" dirty="0" err="1" smtClean="0"/>
+              <a:t>calls</a:t>
+            </a:r>
+            <a:r>
+              <a:rPr lang="nb-NO" dirty="0" smtClean="0"/>
+              <a:t> </a:t>
+            </a:r>
+            <a:r>
+              <a:rPr lang="nb-NO" dirty="0" err="1" smtClean="0"/>
+              <a:t>between</a:t>
+            </a:r>
+            <a:r>
+              <a:rPr lang="nb-NO" dirty="0" smtClean="0"/>
+              <a:t> </a:t>
+            </a:r>
+            <a:r>
+              <a:rPr lang="nb-NO" dirty="0" err="1" smtClean="0"/>
+              <a:t>components</a:t>
+            </a:r>
+            <a:endParaRPr lang="en-US" dirty="0"/>
+          </a:p>
+        </p:txBody>
+      </p:sp>
+    </p:spTree>
+    <p:extLst>
+      <p:ext uri="{BB962C8B-B14F-4D97-AF65-F5344CB8AC3E}">
+        <p14:creationId xmlns:p14="http://schemas.microsoft.com/office/powerpoint/2010/main" val="428744358"/>
+      </p:ext>
+    </p:extLst>
+  </p:cSld>
+  <p:clrMapOvr>
+    <a:masterClrMapping/>
+  </p:clrMapOvr>
+  <p:timing>
+    <p:tnLst>
+      <p:par>
+        <p:cTn id="1" dur="indefinite" restart="never" nodeType="tmRoot"/>
+      </p:par>
+    </p:tnLst>
+  </p:timing>
+</p:sld>
+</file>
+
 <file path=ppt/theme/theme1.xml><?xml version="1.0" encoding="utf-8"?>
 <a:theme xmlns:a="http://schemas.openxmlformats.org/drawingml/2006/main" name="Office Theme">
   <a:themeElements>

</xml_diff>